<commit_message>
removed the sed reports from the methods
</commit_message>
<xml_diff>
--- a/chapter_04/figures/sed_ff_reports.pptx
+++ b/chapter_04/figures/sed_ff_reports.pptx
@@ -15279,12 +15279,12 @@
   <pc:docChgLst>
     <pc:chgData name="Fatima Pillosu" userId="a6295d4dc9e22643" providerId="LiveId" clId="{A940D973-A742-4AD8-97D9-9F5F906670B8}"/>
     <pc:docChg chg="undo custSel modSld">
-      <pc:chgData name="Fatima Pillosu" userId="a6295d4dc9e22643" providerId="LiveId" clId="{A940D973-A742-4AD8-97D9-9F5F906670B8}" dt="2025-06-10T23:15:08.127" v="1951" actId="1035"/>
+      <pc:chgData name="Fatima Pillosu" userId="a6295d4dc9e22643" providerId="LiveId" clId="{A940D973-A742-4AD8-97D9-9F5F906670B8}" dt="2025-06-10T23:20:21.500" v="1983" actId="14100"/>
       <pc:docMkLst>
         <pc:docMk/>
       </pc:docMkLst>
       <pc:sldChg chg="addSp delSp modSp mod">
-        <pc:chgData name="Fatima Pillosu" userId="a6295d4dc9e22643" providerId="LiveId" clId="{A940D973-A742-4AD8-97D9-9F5F906670B8}" dt="2025-06-10T23:15:08.127" v="1951" actId="1035"/>
+        <pc:chgData name="Fatima Pillosu" userId="a6295d4dc9e22643" providerId="LiveId" clId="{A940D973-A742-4AD8-97D9-9F5F906670B8}" dt="2025-06-10T23:20:21.500" v="1983" actId="14100"/>
         <pc:sldMkLst>
           <pc:docMk/>
           <pc:sldMk cId="43451586" sldId="256"/>
@@ -16810,7 +16810,7 @@
           </ac:spMkLst>
         </pc:spChg>
         <pc:spChg chg="add mod">
-          <ac:chgData name="Fatima Pillosu" userId="a6295d4dc9e22643" providerId="LiveId" clId="{A940D973-A742-4AD8-97D9-9F5F906670B8}" dt="2025-06-10T22:51:24.836" v="1368" actId="207"/>
+          <ac:chgData name="Fatima Pillosu" userId="a6295d4dc9e22643" providerId="LiveId" clId="{A940D973-A742-4AD8-97D9-9F5F906670B8}" dt="2025-06-10T23:20:21.500" v="1983" actId="14100"/>
           <ac:spMkLst>
             <pc:docMk/>
             <pc:sldMk cId="43451586" sldId="256"/>
@@ -17170,7 +17170,7 @@
           </ac:spMkLst>
         </pc:spChg>
         <pc:spChg chg="add mod">
-          <ac:chgData name="Fatima Pillosu" userId="a6295d4dc9e22643" providerId="LiveId" clId="{A940D973-A742-4AD8-97D9-9F5F906670B8}" dt="2025-06-10T23:13:36.955" v="1893" actId="1076"/>
+          <ac:chgData name="Fatima Pillosu" userId="a6295d4dc9e22643" providerId="LiveId" clId="{A940D973-A742-4AD8-97D9-9F5F906670B8}" dt="2025-06-10T23:20:05.619" v="1976" actId="20577"/>
           <ac:spMkLst>
             <pc:docMk/>
             <pc:sldMk cId="43451586" sldId="256"/>
@@ -20810,7 +20810,7 @@
           <a:p>
             <a:fld id="{26592153-C028-4DFF-87EE-E61A3F376311}" type="datetimeFigureOut">
               <a:rPr lang="en-GB" smtClean="0"/>
-              <a:t>10/06/2025</a:t>
+              <a:t>11/06/2025</a:t>
             </a:fld>
             <a:endParaRPr lang="en-GB"/>
           </a:p>
@@ -20980,7 +20980,7 @@
           <a:p>
             <a:fld id="{26592153-C028-4DFF-87EE-E61A3F376311}" type="datetimeFigureOut">
               <a:rPr lang="en-GB" smtClean="0"/>
-              <a:t>10/06/2025</a:t>
+              <a:t>11/06/2025</a:t>
             </a:fld>
             <a:endParaRPr lang="en-GB"/>
           </a:p>
@@ -21160,7 +21160,7 @@
           <a:p>
             <a:fld id="{26592153-C028-4DFF-87EE-E61A3F376311}" type="datetimeFigureOut">
               <a:rPr lang="en-GB" smtClean="0"/>
-              <a:t>10/06/2025</a:t>
+              <a:t>11/06/2025</a:t>
             </a:fld>
             <a:endParaRPr lang="en-GB"/>
           </a:p>
@@ -21330,7 +21330,7 @@
           <a:p>
             <a:fld id="{26592153-C028-4DFF-87EE-E61A3F376311}" type="datetimeFigureOut">
               <a:rPr lang="en-GB" smtClean="0"/>
-              <a:t>10/06/2025</a:t>
+              <a:t>11/06/2025</a:t>
             </a:fld>
             <a:endParaRPr lang="en-GB"/>
           </a:p>
@@ -21574,7 +21574,7 @@
           <a:p>
             <a:fld id="{26592153-C028-4DFF-87EE-E61A3F376311}" type="datetimeFigureOut">
               <a:rPr lang="en-GB" smtClean="0"/>
-              <a:t>10/06/2025</a:t>
+              <a:t>11/06/2025</a:t>
             </a:fld>
             <a:endParaRPr lang="en-GB"/>
           </a:p>
@@ -21806,7 +21806,7 @@
           <a:p>
             <a:fld id="{26592153-C028-4DFF-87EE-E61A3F376311}" type="datetimeFigureOut">
               <a:rPr lang="en-GB" smtClean="0"/>
-              <a:t>10/06/2025</a:t>
+              <a:t>11/06/2025</a:t>
             </a:fld>
             <a:endParaRPr lang="en-GB"/>
           </a:p>
@@ -22173,7 +22173,7 @@
           <a:p>
             <a:fld id="{26592153-C028-4DFF-87EE-E61A3F376311}" type="datetimeFigureOut">
               <a:rPr lang="en-GB" smtClean="0"/>
-              <a:t>10/06/2025</a:t>
+              <a:t>11/06/2025</a:t>
             </a:fld>
             <a:endParaRPr lang="en-GB"/>
           </a:p>
@@ -22291,7 +22291,7 @@
           <a:p>
             <a:fld id="{26592153-C028-4DFF-87EE-E61A3F376311}" type="datetimeFigureOut">
               <a:rPr lang="en-GB" smtClean="0"/>
-              <a:t>10/06/2025</a:t>
+              <a:t>11/06/2025</a:t>
             </a:fld>
             <a:endParaRPr lang="en-GB"/>
           </a:p>
@@ -22386,7 +22386,7 @@
           <a:p>
             <a:fld id="{26592153-C028-4DFF-87EE-E61A3F376311}" type="datetimeFigureOut">
               <a:rPr lang="en-GB" smtClean="0"/>
-              <a:t>10/06/2025</a:t>
+              <a:t>11/06/2025</a:t>
             </a:fld>
             <a:endParaRPr lang="en-GB"/>
           </a:p>
@@ -22663,7 +22663,7 @@
           <a:p>
             <a:fld id="{26592153-C028-4DFF-87EE-E61A3F376311}" type="datetimeFigureOut">
               <a:rPr lang="en-GB" smtClean="0"/>
-              <a:t>10/06/2025</a:t>
+              <a:t>11/06/2025</a:t>
             </a:fld>
             <a:endParaRPr lang="en-GB"/>
           </a:p>
@@ -22920,7 +22920,7 @@
           <a:p>
             <a:fld id="{26592153-C028-4DFF-87EE-E61A3F376311}" type="datetimeFigureOut">
               <a:rPr lang="en-GB" smtClean="0"/>
-              <a:t>10/06/2025</a:t>
+              <a:t>11/06/2025</a:t>
             </a:fld>
             <a:endParaRPr lang="en-GB"/>
           </a:p>
@@ -23133,7 +23133,7 @@
           <a:p>
             <a:fld id="{26592153-C028-4DFF-87EE-E61A3F376311}" type="datetimeFigureOut">
               <a:rPr lang="en-GB" smtClean="0"/>
-              <a:t>10/06/2025</a:t>
+              <a:t>11/06/2025</a:t>
             </a:fld>
             <a:endParaRPr lang="en-GB"/>
           </a:p>
@@ -26538,7 +26538,7 @@
         <p:spPr>
           <a:xfrm>
             <a:off x="1995080" y="349275"/>
-            <a:ext cx="2349486" cy="338554"/>
+            <a:ext cx="2224495" cy="338554"/>
           </a:xfrm>
           <a:prstGeom prst="rect">
             <a:avLst/>
@@ -26558,7 +26558,7 @@
                 </a:solidFill>
                 <a:latin typeface="+mj-lt"/>
               </a:rPr>
-              <a:t>b) Timeseries of flood report counts per year, between 1950 and 2024</a:t>
+              <a:t>b) Timeseries of point flood report counts per year, between 1950 and 2024</a:t>
             </a:r>
           </a:p>
         </p:txBody>
@@ -27592,7 +27592,7 @@
                 </a:solidFill>
                 <a:latin typeface="+mj-lt"/>
               </a:rPr>
-              <a:t>a) Spatial distribution of the frequency of flash flood impact report counts per grid-box, between 2001 and 2024</a:t>
+              <a:t>a) Spatial distribution for the frequency of point flash flood impact report counts per grid-box, between 2001 and 2024</a:t>
             </a:r>
           </a:p>
         </p:txBody>

</xml_diff>